<commit_message>
Making sure latest is in sync
</commit_message>
<xml_diff>
--- a/Documentation/Clinical Concepts for Healthcare Information Sharing.pptx
+++ b/Documentation/Clinical Concepts for Healthcare Information Sharing.pptx
@@ -364,7 +364,7 @@
           <a:p>
             <a:fld id="{ED291B17-9318-49DB-B28B-6E5994AE9581}" type="datetime1">
               <a:rPr lang="en-US" smtClean="0"/>
-              <a:t>3/21/2021</a:t>
+              <a:t>3/25/2021</a:t>
             </a:fld>
             <a:endParaRPr lang="en-US" dirty="0"/>
           </a:p>
@@ -562,7 +562,7 @@
           <a:p>
             <a:fld id="{78DD82B9-B8EE-4375-B6FF-88FA6ABB15D9}" type="datetime1">
               <a:rPr lang="en-US" smtClean="0"/>
-              <a:t>3/21/2021</a:t>
+              <a:t>3/25/2021</a:t>
             </a:fld>
             <a:endParaRPr lang="en-US" dirty="0"/>
           </a:p>
@@ -874,7 +874,7 @@
           <a:p>
             <a:fld id="{B2497495-0637-405E-AE64-5CC7506D51F5}" type="datetime1">
               <a:rPr lang="en-US" smtClean="0"/>
-              <a:t>3/21/2021</a:t>
+              <a:t>3/25/2021</a:t>
             </a:fld>
             <a:endParaRPr lang="en-US" dirty="0"/>
           </a:p>
@@ -1127,7 +1127,7 @@
           <a:p>
             <a:fld id="{7BFFD690-9426-415D-8B65-26881E07B2D4}" type="datetime1">
               <a:rPr lang="en-US" smtClean="0"/>
-              <a:t>3/21/2021</a:t>
+              <a:t>3/25/2021</a:t>
             </a:fld>
             <a:endParaRPr lang="en-US" dirty="0"/>
           </a:p>
@@ -1549,7 +1549,7 @@
           <a:p>
             <a:fld id="{04C4989A-474C-40DE-95B9-011C28B71673}" type="datetime1">
               <a:rPr lang="en-US" smtClean="0"/>
-              <a:t>3/21/2021</a:t>
+              <a:t>3/25/2021</a:t>
             </a:fld>
             <a:endParaRPr lang="en-US" dirty="0"/>
           </a:p>
@@ -1672,7 +1672,7 @@
           <a:p>
             <a:fld id="{5DB4ED54-5B5E-4A04-93D3-5772E3CE3818}" type="datetime1">
               <a:rPr lang="en-US" smtClean="0"/>
-              <a:t>3/21/2021</a:t>
+              <a:t>3/25/2021</a:t>
             </a:fld>
             <a:endParaRPr lang="en-US" dirty="0"/>
           </a:p>
@@ -1767,7 +1767,7 @@
           <a:p>
             <a:fld id="{4EDE50D6-574B-40AF-946F-D52A04ADE379}" type="datetime1">
               <a:rPr lang="en-US" smtClean="0"/>
-              <a:t>3/21/2021</a:t>
+              <a:t>3/25/2021</a:t>
             </a:fld>
             <a:endParaRPr lang="en-US" dirty="0"/>
           </a:p>
@@ -2144,7 +2144,7 @@
           <a:p>
             <a:fld id="{D82884F1-FFEA-405F-9602-3DCA865EDA4E}" type="datetime1">
               <a:rPr lang="en-US" smtClean="0"/>
-              <a:t>3/21/2021</a:t>
+              <a:t>3/25/2021</a:t>
             </a:fld>
             <a:endParaRPr lang="en-US" dirty="0"/>
           </a:p>
@@ -2437,7 +2437,7 @@
           <a:p>
             <a:fld id="{7E18DB4A-8810-4A10-AD5C-D5E2C667F5B3}" type="datetime1">
               <a:rPr lang="en-US" smtClean="0"/>
-              <a:t>3/21/2021</a:t>
+              <a:t>3/25/2021</a:t>
             </a:fld>
             <a:endParaRPr lang="en-US" dirty="0"/>
           </a:p>
@@ -2652,7 +2652,7 @@
           <a:p>
             <a:fld id="{ED291B17-9318-49DB-B28B-6E5994AE9581}" type="datetime1">
               <a:rPr lang="en-US" smtClean="0"/>
-              <a:t>3/21/2021</a:t>
+              <a:t>3/25/2021</a:t>
             </a:fld>
             <a:endParaRPr lang="en-US" dirty="0"/>
           </a:p>
@@ -4121,9 +4121,15 @@
         </p:spPr>
         <p:txBody>
           <a:bodyPr anchor="t" anchorCtr="0">
-            <a:normAutofit fontScale="92500" lnSpcReduction="20000"/>
+            <a:normAutofit fontScale="85000" lnSpcReduction="10000"/>
           </a:bodyPr>
           <a:lstStyle/>
+          <a:p>
+            <a:r>
+              <a:rPr lang="en-US" dirty="0"/>
+              <a:t>MDMI uses the model as a reference for meaning, not to enable inference of actual data.</a:t>
+            </a:r>
+          </a:p>
           <a:p>
             <a:r>
               <a:rPr lang="en-US" dirty="0"/>
@@ -5787,6 +5793,12 @@
             </a:r>
           </a:p>
           <a:p>
+            <a:r>
+              <a:rPr lang="en-US" dirty="0"/>
+              <a:t>Context is critical</a:t>
+            </a:r>
+          </a:p>
+          <a:p>
             <a:endParaRPr lang="en-US" dirty="0"/>
           </a:p>
         </p:txBody>
@@ -5907,7 +5919,7 @@
         </p:blipFill>
         <p:spPr>
           <a:xfrm>
-            <a:off x="552421" y="3848766"/>
+            <a:off x="778563" y="3593127"/>
             <a:ext cx="9572625" cy="2076450"/>
           </a:xfrm>
           <a:prstGeom prst="rect">
@@ -5929,7 +5941,7 @@
         </p:nvSpPr>
         <p:spPr>
           <a:xfrm>
-            <a:off x="7617846" y="3532494"/>
+            <a:off x="7843988" y="3276855"/>
             <a:ext cx="2569934" cy="369332"/>
           </a:xfrm>
           <a:prstGeom prst="rect">
@@ -5968,7 +5980,7 @@
         </p:nvSpPr>
         <p:spPr>
           <a:xfrm rot="10800000">
-            <a:off x="8195241" y="4042753"/>
+            <a:off x="8421383" y="3787114"/>
             <a:ext cx="707572" cy="988332"/>
           </a:xfrm>
           <a:prstGeom prst="bentArrow">
@@ -6018,7 +6030,7 @@
         </p:nvSpPr>
         <p:spPr>
           <a:xfrm>
-            <a:off x="2667000" y="2242457"/>
+            <a:off x="2893142" y="1986818"/>
             <a:ext cx="4386942" cy="1343096"/>
           </a:xfrm>
           <a:prstGeom prst="cloudCallout">
@@ -6138,7 +6150,7 @@
         </p:spPr>
         <p:txBody>
           <a:bodyPr>
-            <a:normAutofit fontScale="92500"/>
+            <a:normAutofit fontScale="92500" lnSpcReduction="10000"/>
           </a:bodyPr>
           <a:lstStyle/>
           <a:p>
@@ -6188,7 +6200,15 @@
             <a:pPr lvl="1"/>
             <a:r>
               <a:rPr lang="en-US" dirty="0"/>
-              <a:t>Situations can be as granular as John’s temperature or as large as the Corona-19 Virus</a:t>
+              <a:t>Situations can be as </a:t>
+            </a:r>
+            <a:r>
+              <a:rPr lang="en-US" b="1" dirty="0"/>
+              <a:t>granular</a:t>
+            </a:r>
+            <a:r>
+              <a:rPr lang="en-US" dirty="0"/>
+              <a:t> as John’s temperature or as large as the Corona-19 Virus</a:t>
             </a:r>
           </a:p>
           <a:p>
@@ -6196,6 +6216,17 @@
             <a:r>
               <a:rPr lang="en-US" dirty="0"/>
               <a:t>Situation semantics has a long history, pioneered by Jon Barwise and John Perry in the early 1980s</a:t>
+            </a:r>
+          </a:p>
+          <a:p>
+            <a:pPr lvl="1"/>
+            <a:r>
+              <a:rPr lang="en-US" dirty="0"/>
+              <a:t>Provide the basis for </a:t>
+            </a:r>
+            <a:r>
+              <a:rPr lang="en-US" b="1" dirty="0"/>
+              <a:t>context</a:t>
             </a:r>
           </a:p>
           <a:p>

</xml_diff>